<commit_message>
Apply code layout (#4)
</commit_message>
<xml_diff>
--- a/inst/template.pptx
+++ b/inst/template.pptx
@@ -211,7 +211,7 @@
           <a:p>
             <a:fld id="{0F9C1CCF-B725-44A7-AA57-5E433BD85C9F}" type="datetimeFigureOut">
               <a:rPr lang="en-US" smtClean="0"/>
-              <a:t>3/24/2025</a:t>
+              <a:t>4/17/2025</a:t>
             </a:fld>
             <a:endParaRPr lang="en-US"/>
           </a:p>
@@ -929,7 +929,7 @@
 
 <file path=ppt/slideLayouts/slideLayout10.xml><?xml version="1.0" encoding="utf-8"?>
 <p:sldLayout xmlns:a="http://schemas.openxmlformats.org/drawingml/2006/main" xmlns:r="http://schemas.openxmlformats.org/officeDocument/2006/relationships" xmlns:p="http://schemas.openxmlformats.org/presentationml/2006/main" preserve="1" userDrawn="1">
-  <p:cSld name="Big Idea Slide-User">
+  <p:cSld name="Big Idea Slide-Pharma">
     <p:bg>
       <p:bgPr>
         <a:blipFill dpi="0" rotWithShape="1">
@@ -968,6 +968,255 @@
           <p:cNvPr id="3" name="Title 1">
             <a:extLst>
               <a:ext uri="{FF2B5EF4-FFF2-40B4-BE49-F238E27FC236}">
+                <a16:creationId xmlns:a16="http://schemas.microsoft.com/office/drawing/2014/main" id="{3DC1B2E9-91E9-4E4A-9ACC-B3C8E29F4B97}"/>
+              </a:ext>
+            </a:extLst>
+          </p:cNvPr>
+          <p:cNvSpPr>
+            <a:spLocks noGrp="1"/>
+          </p:cNvSpPr>
+          <p:nvPr>
+            <p:ph type="ctrTitle"/>
+          </p:nvPr>
+        </p:nvSpPr>
+        <p:spPr>
+          <a:xfrm>
+            <a:off x="271119" y="459231"/>
+            <a:ext cx="5032401" cy="1661187"/>
+          </a:xfrm>
+        </p:spPr>
+        <p:txBody>
+          <a:bodyPr anchor="b">
+            <a:normAutofit/>
+          </a:bodyPr>
+          <a:lstStyle>
+            <a:lvl1pPr algn="l">
+              <a:defRPr sz="4000" b="1">
+                <a:solidFill>
+                  <a:schemeClr val="bg1"/>
+                </a:solidFill>
+              </a:defRPr>
+            </a:lvl1pPr>
+          </a:lstStyle>
+          <a:p>
+            <a:r>
+              <a:rPr lang="en-US"/>
+              <a:t>Click to edit Master title style</a:t>
+            </a:r>
+          </a:p>
+        </p:txBody>
+      </p:sp>
+      <p:sp>
+        <p:nvSpPr>
+          <p:cNvPr id="4" name="Subtitle 2">
+            <a:extLst>
+              <a:ext uri="{FF2B5EF4-FFF2-40B4-BE49-F238E27FC236}">
+                <a16:creationId xmlns:a16="http://schemas.microsoft.com/office/drawing/2014/main" id="{2AD3EA5D-E588-DE49-84C4-9D7CCE087B79}"/>
+              </a:ext>
+            </a:extLst>
+          </p:cNvPr>
+          <p:cNvSpPr>
+            <a:spLocks noGrp="1"/>
+          </p:cNvSpPr>
+          <p:nvPr>
+            <p:ph type="subTitle" idx="1"/>
+          </p:nvPr>
+        </p:nvSpPr>
+        <p:spPr>
+          <a:xfrm>
+            <a:off x="271118" y="2120420"/>
+            <a:ext cx="5032401" cy="496796"/>
+          </a:xfrm>
+        </p:spPr>
+        <p:txBody>
+          <a:bodyPr/>
+          <a:lstStyle>
+            <a:lvl1pPr marL="0" indent="0" algn="l">
+              <a:buNone/>
+              <a:defRPr sz="2400">
+                <a:solidFill>
+                  <a:schemeClr val="accent1"/>
+                </a:solidFill>
+              </a:defRPr>
+            </a:lvl1pPr>
+            <a:lvl2pPr marL="457200" indent="0" algn="ctr">
+              <a:buNone/>
+              <a:defRPr sz="2000"/>
+            </a:lvl2pPr>
+            <a:lvl3pPr marL="914400" indent="0" algn="ctr">
+              <a:buNone/>
+              <a:defRPr sz="1800"/>
+            </a:lvl3pPr>
+            <a:lvl4pPr marL="1371600" indent="0" algn="ctr">
+              <a:buNone/>
+              <a:defRPr sz="1600"/>
+            </a:lvl4pPr>
+            <a:lvl5pPr marL="1828800" indent="0" algn="ctr">
+              <a:buNone/>
+              <a:defRPr sz="1600"/>
+            </a:lvl5pPr>
+            <a:lvl6pPr marL="2286000" indent="0" algn="ctr">
+              <a:buNone/>
+              <a:defRPr sz="1600"/>
+            </a:lvl6pPr>
+            <a:lvl7pPr marL="2743200" indent="0" algn="ctr">
+              <a:buNone/>
+              <a:defRPr sz="1600"/>
+            </a:lvl7pPr>
+            <a:lvl8pPr marL="3200400" indent="0" algn="ctr">
+              <a:buNone/>
+              <a:defRPr sz="1600"/>
+            </a:lvl8pPr>
+            <a:lvl9pPr marL="3657600" indent="0" algn="ctr">
+              <a:buNone/>
+              <a:defRPr sz="1600"/>
+            </a:lvl9pPr>
+          </a:lstStyle>
+          <a:p>
+            <a:r>
+              <a:rPr lang="en-US"/>
+              <a:t>Click to edit Master subtitle style</a:t>
+            </a:r>
+          </a:p>
+        </p:txBody>
+      </p:sp>
+      <p:sp>
+        <p:nvSpPr>
+          <p:cNvPr id="2" name="Date Placeholder 1">
+            <a:extLst>
+              <a:ext uri="{FF2B5EF4-FFF2-40B4-BE49-F238E27FC236}">
+                <a16:creationId xmlns:a16="http://schemas.microsoft.com/office/drawing/2014/main" id="{DE79A3F2-84EC-3A2C-B4AA-4D0FD7F78CBC}"/>
+              </a:ext>
+            </a:extLst>
+          </p:cNvPr>
+          <p:cNvSpPr>
+            <a:spLocks noGrp="1"/>
+          </p:cNvSpPr>
+          <p:nvPr>
+            <p:ph type="dt" sz="half" idx="10"/>
+          </p:nvPr>
+        </p:nvSpPr>
+        <p:spPr/>
+        <p:txBody>
+          <a:bodyPr/>
+          <a:lstStyle/>
+          <a:p>
+            <a:r>
+              <a:rPr lang="en-US"/>
+              <a:t>3/24/2025</a:t>
+            </a:r>
+            <a:endParaRPr lang="en-US" dirty="0"/>
+          </a:p>
+        </p:txBody>
+      </p:sp>
+      <p:sp>
+        <p:nvSpPr>
+          <p:cNvPr id="5" name="Footer Placeholder 4">
+            <a:extLst>
+              <a:ext uri="{FF2B5EF4-FFF2-40B4-BE49-F238E27FC236}">
+                <a16:creationId xmlns:a16="http://schemas.microsoft.com/office/drawing/2014/main" id="{102C7174-4CC0-42E6-4EF7-9A0201C37039}"/>
+              </a:ext>
+            </a:extLst>
+          </p:cNvPr>
+          <p:cNvSpPr>
+            <a:spLocks noGrp="1"/>
+          </p:cNvSpPr>
+          <p:nvPr>
+            <p:ph type="ftr" sz="quarter" idx="11"/>
+          </p:nvPr>
+        </p:nvSpPr>
+        <p:spPr/>
+        <p:txBody>
+          <a:bodyPr/>
+          <a:lstStyle/>
+          <a:p>
+            <a:endParaRPr lang="en-US"/>
+          </a:p>
+        </p:txBody>
+      </p:sp>
+      <p:sp>
+        <p:nvSpPr>
+          <p:cNvPr id="6" name="Slide Number Placeholder 5">
+            <a:extLst>
+              <a:ext uri="{FF2B5EF4-FFF2-40B4-BE49-F238E27FC236}">
+                <a16:creationId xmlns:a16="http://schemas.microsoft.com/office/drawing/2014/main" id="{D6AECB34-406F-4C02-7A44-484F08A36B53}"/>
+              </a:ext>
+            </a:extLst>
+          </p:cNvPr>
+          <p:cNvSpPr>
+            <a:spLocks noGrp="1"/>
+          </p:cNvSpPr>
+          <p:nvPr>
+            <p:ph type="sldNum" sz="quarter" idx="12"/>
+          </p:nvPr>
+        </p:nvSpPr>
+        <p:spPr/>
+        <p:txBody>
+          <a:bodyPr/>
+          <a:lstStyle/>
+          <a:p>
+            <a:fld id="{2E79E3EC-1613-4091-B944-3429E9D119DF}" type="slidenum">
+              <a:rPr lang="en-US" smtClean="0"/>
+              <a:t>‹#›</a:t>
+            </a:fld>
+            <a:endParaRPr lang="en-US" dirty="0"/>
+          </a:p>
+        </p:txBody>
+      </p:sp>
+    </p:spTree>
+    <p:extLst>
+      <p:ext uri="{BB962C8B-B14F-4D97-AF65-F5344CB8AC3E}">
+        <p14:creationId xmlns:p14="http://schemas.microsoft.com/office/powerpoint/2010/main" val="1644859707"/>
+      </p:ext>
+    </p:extLst>
+  </p:cSld>
+  <p:clrMapOvr>
+    <a:masterClrMapping/>
+  </p:clrMapOvr>
+</p:sldLayout>
+</file>
+
+<file path=ppt/slideLayouts/slideLayout11.xml><?xml version="1.0" encoding="utf-8"?>
+<p:sldLayout xmlns:a="http://schemas.openxmlformats.org/drawingml/2006/main" xmlns:r="http://schemas.openxmlformats.org/officeDocument/2006/relationships" xmlns:p="http://schemas.openxmlformats.org/presentationml/2006/main" preserve="1" userDrawn="1">
+  <p:cSld name="Big Idea Slide-User">
+    <p:bg>
+      <p:bgPr>
+        <a:blipFill dpi="0" rotWithShape="1">
+          <a:blip r:embed="rId2" cstate="screen">
+            <a:lum/>
+            <a:extLst>
+              <a:ext uri="{28A0092B-C50C-407E-A947-70E740481C1C}">
+                <a14:useLocalDpi xmlns:a14="http://schemas.microsoft.com/office/drawing/2010/main"/>
+              </a:ext>
+            </a:extLst>
+          </a:blip>
+          <a:srcRect/>
+          <a:stretch>
+            <a:fillRect/>
+          </a:stretch>
+        </a:blipFill>
+        <a:effectLst/>
+      </p:bgPr>
+    </p:bg>
+    <p:spTree>
+      <p:nvGrpSpPr>
+        <p:cNvPr id="1" name=""/>
+        <p:cNvGrpSpPr/>
+        <p:nvPr/>
+      </p:nvGrpSpPr>
+      <p:grpSpPr>
+        <a:xfrm>
+          <a:off x="0" y="0"/>
+          <a:ext cx="0" cy="0"/>
+          <a:chOff x="0" y="0"/>
+          <a:chExt cx="0" cy="0"/>
+        </a:xfrm>
+      </p:grpSpPr>
+      <p:sp>
+        <p:nvSpPr>
+          <p:cNvPr id="3" name="Title 1">
+            <a:extLst>
+              <a:ext uri="{FF2B5EF4-FFF2-40B4-BE49-F238E27FC236}">
                 <a16:creationId xmlns:a16="http://schemas.microsoft.com/office/drawing/2014/main" id="{7B0FD854-6148-C240-A6DD-BFCDBB4360A1}"/>
               </a:ext>
             </a:extLst>
@@ -1176,7 +1425,7 @@
 </p:sldLayout>
 </file>
 
-<file path=ppt/slideLayouts/slideLayout11.xml><?xml version="1.0" encoding="utf-8"?>
+<file path=ppt/slideLayouts/slideLayout12.xml><?xml version="1.0" encoding="utf-8"?>
 <p:sldLayout xmlns:a="http://schemas.openxmlformats.org/drawingml/2006/main" xmlns:r="http://schemas.openxmlformats.org/officeDocument/2006/relationships" xmlns:p="http://schemas.openxmlformats.org/presentationml/2006/main" preserve="1">
   <p:cSld name="Analytics Engineering">
     <p:bg>
@@ -1420,7 +1669,7 @@
 </p:sldLayout>
 </file>
 
-<file path=ppt/slideLayouts/slideLayout12.xml><?xml version="1.0" encoding="utf-8"?>
+<file path=ppt/slideLayouts/slideLayout13.xml><?xml version="1.0" encoding="utf-8"?>
 <p:sldLayout xmlns:a="http://schemas.openxmlformats.org/drawingml/2006/main" xmlns:r="http://schemas.openxmlformats.org/officeDocument/2006/relationships" xmlns:p="http://schemas.openxmlformats.org/presentationml/2006/main" preserve="1">
   <p:cSld name="OpenVal">
     <p:bg>
@@ -1700,7 +1949,7 @@
 </p:sldLayout>
 </file>
 
-<file path=ppt/slideLayouts/slideLayout13.xml><?xml version="1.0" encoding="utf-8"?>
+<file path=ppt/slideLayouts/slideLayout14.xml><?xml version="1.0" encoding="utf-8"?>
 <p:sldLayout xmlns:a="http://schemas.openxmlformats.org/drawingml/2006/main" xmlns:r="http://schemas.openxmlformats.org/officeDocument/2006/relationships" xmlns:p="http://schemas.openxmlformats.org/presentationml/2006/main" preserve="1">
   <p:cSld name="Two Content">
     <p:spTree>
@@ -1773,35 +2022,35 @@
           <a:p>
             <a:pPr lvl="0"/>
             <a:r>
-              <a:rPr lang="en-US"/>
+              <a:rPr lang="en-US" dirty="0"/>
               <a:t>Click to edit Master text styles</a:t>
             </a:r>
           </a:p>
           <a:p>
             <a:pPr lvl="1"/>
             <a:r>
-              <a:rPr lang="en-US"/>
+              <a:rPr lang="en-US" dirty="0"/>
               <a:t>Second level</a:t>
             </a:r>
           </a:p>
           <a:p>
             <a:pPr lvl="2"/>
             <a:r>
-              <a:rPr lang="en-US"/>
+              <a:rPr lang="en-US" dirty="0"/>
               <a:t>Third level</a:t>
             </a:r>
           </a:p>
           <a:p>
             <a:pPr lvl="3"/>
             <a:r>
-              <a:rPr lang="en-US"/>
+              <a:rPr lang="en-US" dirty="0"/>
               <a:t>Fourth level</a:t>
             </a:r>
           </a:p>
           <a:p>
             <a:pPr lvl="4"/>
             <a:r>
-              <a:rPr lang="en-US"/>
+              <a:rPr lang="en-US" dirty="0"/>
               <a:t>Fifth level</a:t>
             </a:r>
           </a:p>
@@ -2056,7 +2305,7 @@
 </p:sldLayout>
 </file>
 
-<file path=ppt/slideLayouts/slideLayout14.xml><?xml version="1.0" encoding="utf-8"?>
+<file path=ppt/slideLayouts/slideLayout15.xml><?xml version="1.0" encoding="utf-8"?>
 <p:sldLayout xmlns:a="http://schemas.openxmlformats.org/drawingml/2006/main" xmlns:r="http://schemas.openxmlformats.org/officeDocument/2006/relationships" xmlns:p="http://schemas.openxmlformats.org/presentationml/2006/main" preserve="1">
   <p:cSld name="Comparison">
     <p:spTree>
@@ -2385,7 +2634,7 @@
           <a:p>
             <a:pPr lvl="0"/>
             <a:r>
-              <a:rPr lang="en-US"/>
+              <a:rPr lang="en-US" dirty="0"/>
               <a:t>Click to edit Master text styles</a:t>
             </a:r>
           </a:p>
@@ -2562,7 +2811,7 @@
 </p:sldLayout>
 </file>
 
-<file path=ppt/slideLayouts/slideLayout15.xml><?xml version="1.0" encoding="utf-8"?>
+<file path=ppt/slideLayouts/slideLayout16.xml><?xml version="1.0" encoding="utf-8"?>
 <p:sldLayout xmlns:a="http://schemas.openxmlformats.org/drawingml/2006/main" xmlns:r="http://schemas.openxmlformats.org/officeDocument/2006/relationships" xmlns:p="http://schemas.openxmlformats.org/presentationml/2006/main" type="titleOnly" preserve="1">
   <p:cSld name="Title Only">
     <p:spTree>
@@ -2794,7 +3043,7 @@
 </p:sldLayout>
 </file>
 
-<file path=ppt/slideLayouts/slideLayout16.xml><?xml version="1.0" encoding="utf-8"?>
+<file path=ppt/slideLayouts/slideLayout17.xml><?xml version="1.0" encoding="utf-8"?>
 <p:sldLayout xmlns:a="http://schemas.openxmlformats.org/drawingml/2006/main" xmlns:r="http://schemas.openxmlformats.org/officeDocument/2006/relationships" xmlns:p="http://schemas.openxmlformats.org/presentationml/2006/main" type="blank" preserve="1">
   <p:cSld name="Blank">
     <p:spTree>
@@ -2959,7 +3208,7 @@
 </p:sldLayout>
 </file>
 
-<file path=ppt/slideLayouts/slideLayout17.xml><?xml version="1.0" encoding="utf-8"?>
+<file path=ppt/slideLayouts/slideLayout18.xml><?xml version="1.0" encoding="utf-8"?>
 <p:sldLayout xmlns:a="http://schemas.openxmlformats.org/drawingml/2006/main" xmlns:r="http://schemas.openxmlformats.org/officeDocument/2006/relationships" xmlns:p="http://schemas.openxmlformats.org/presentationml/2006/main" type="objTx" preserve="1">
   <p:cSld name="Content with Caption">
     <p:spTree>
@@ -3150,7 +3399,7 @@
           <a:p>
             <a:pPr lvl="0"/>
             <a:r>
-              <a:rPr lang="en-US"/>
+              <a:rPr lang="en-US" dirty="0"/>
               <a:t>Click to edit Master text styles</a:t>
             </a:r>
           </a:p>
@@ -3252,7 +3501,7 @@
 </p:sldLayout>
 </file>
 
-<file path=ppt/slideLayouts/slideLayout18.xml><?xml version="1.0" encoding="utf-8"?>
+<file path=ppt/slideLayouts/slideLayout19.xml><?xml version="1.0" encoding="utf-8"?>
 <p:sldLayout xmlns:a="http://schemas.openxmlformats.org/drawingml/2006/main" xmlns:r="http://schemas.openxmlformats.org/officeDocument/2006/relationships" xmlns:p="http://schemas.openxmlformats.org/presentationml/2006/main" preserve="1">
   <p:cSld name="Picture with Caption">
     <p:spTree>
@@ -3578,198 +3827,6 @@
     <p:extLst>
       <p:ext uri="{BB962C8B-B14F-4D97-AF65-F5344CB8AC3E}">
         <p14:creationId xmlns:p14="http://schemas.microsoft.com/office/powerpoint/2010/main" val="3485729417"/>
-      </p:ext>
-    </p:extLst>
-  </p:cSld>
-  <p:clrMapOvr>
-    <a:masterClrMapping/>
-  </p:clrMapOvr>
-</p:sldLayout>
-</file>
-
-<file path=ppt/slideLayouts/slideLayout19.xml><?xml version="1.0" encoding="utf-8"?>
-<p:sldLayout xmlns:a="http://schemas.openxmlformats.org/drawingml/2006/main" xmlns:r="http://schemas.openxmlformats.org/officeDocument/2006/relationships" xmlns:p="http://schemas.openxmlformats.org/presentationml/2006/main" preserve="1" userDrawn="1">
-  <p:cSld name="Title and Vertical Text">
-    <p:spTree>
-      <p:nvGrpSpPr>
-        <p:cNvPr id="1" name=""/>
-        <p:cNvGrpSpPr/>
-        <p:nvPr/>
-      </p:nvGrpSpPr>
-      <p:grpSpPr>
-        <a:xfrm>
-          <a:off x="0" y="0"/>
-          <a:ext cx="0" cy="0"/>
-          <a:chOff x="0" y="0"/>
-          <a:chExt cx="0" cy="0"/>
-        </a:xfrm>
-      </p:grpSpPr>
-      <p:sp>
-        <p:nvSpPr>
-          <p:cNvPr id="3" name="Vertical Text Placeholder 2"/>
-          <p:cNvSpPr>
-            <a:spLocks noGrp="1"/>
-          </p:cNvSpPr>
-          <p:nvPr>
-            <p:ph type="body" orient="vert" idx="1"/>
-          </p:nvPr>
-        </p:nvSpPr>
-        <p:spPr/>
-        <p:txBody>
-          <a:bodyPr vert="eaVert"/>
-          <a:lstStyle/>
-          <a:p>
-            <a:pPr lvl="0"/>
-            <a:r>
-              <a:rPr lang="en-US"/>
-              <a:t>Click to edit Master text styles</a:t>
-            </a:r>
-          </a:p>
-          <a:p>
-            <a:pPr lvl="1"/>
-            <a:r>
-              <a:rPr lang="en-US"/>
-              <a:t>Second level</a:t>
-            </a:r>
-          </a:p>
-          <a:p>
-            <a:pPr lvl="2"/>
-            <a:r>
-              <a:rPr lang="en-US"/>
-              <a:t>Third level</a:t>
-            </a:r>
-          </a:p>
-          <a:p>
-            <a:pPr lvl="3"/>
-            <a:r>
-              <a:rPr lang="en-US"/>
-              <a:t>Fourth level</a:t>
-            </a:r>
-          </a:p>
-          <a:p>
-            <a:pPr lvl="4"/>
-            <a:r>
-              <a:rPr lang="en-US"/>
-              <a:t>Fifth level</a:t>
-            </a:r>
-          </a:p>
-        </p:txBody>
-      </p:sp>
-      <p:sp>
-        <p:nvSpPr>
-          <p:cNvPr id="5" name="Title 4">
-            <a:extLst>
-              <a:ext uri="{FF2B5EF4-FFF2-40B4-BE49-F238E27FC236}">
-                <a16:creationId xmlns:a16="http://schemas.microsoft.com/office/drawing/2014/main" id="{E2BEB535-1D04-3D9D-3D3A-F7419BBAA6EE}"/>
-              </a:ext>
-            </a:extLst>
-          </p:cNvPr>
-          <p:cNvSpPr>
-            <a:spLocks noGrp="1"/>
-          </p:cNvSpPr>
-          <p:nvPr>
-            <p:ph type="title"/>
-          </p:nvPr>
-        </p:nvSpPr>
-        <p:spPr/>
-        <p:txBody>
-          <a:bodyPr/>
-          <a:lstStyle/>
-          <a:p>
-            <a:r>
-              <a:rPr lang="en-US"/>
-              <a:t>Click to edit Master title style</a:t>
-            </a:r>
-          </a:p>
-        </p:txBody>
-      </p:sp>
-      <p:sp>
-        <p:nvSpPr>
-          <p:cNvPr id="2" name="Date Placeholder 1">
-            <a:extLst>
-              <a:ext uri="{FF2B5EF4-FFF2-40B4-BE49-F238E27FC236}">
-                <a16:creationId xmlns:a16="http://schemas.microsoft.com/office/drawing/2014/main" id="{7D1933A3-C226-ECCF-53E6-EE16A5E22F34}"/>
-              </a:ext>
-            </a:extLst>
-          </p:cNvPr>
-          <p:cNvSpPr>
-            <a:spLocks noGrp="1"/>
-          </p:cNvSpPr>
-          <p:nvPr>
-            <p:ph type="dt" sz="half" idx="10"/>
-          </p:nvPr>
-        </p:nvSpPr>
-        <p:spPr/>
-        <p:txBody>
-          <a:bodyPr/>
-          <a:lstStyle/>
-          <a:p>
-            <a:r>
-              <a:rPr lang="en-US"/>
-              <a:t>3/24/2025</a:t>
-            </a:r>
-            <a:endParaRPr lang="en-US" dirty="0"/>
-          </a:p>
-        </p:txBody>
-      </p:sp>
-      <p:sp>
-        <p:nvSpPr>
-          <p:cNvPr id="4" name="Footer Placeholder 3">
-            <a:extLst>
-              <a:ext uri="{FF2B5EF4-FFF2-40B4-BE49-F238E27FC236}">
-                <a16:creationId xmlns:a16="http://schemas.microsoft.com/office/drawing/2014/main" id="{31590124-F4AD-4E6A-3BCC-3A8B143173F0}"/>
-              </a:ext>
-            </a:extLst>
-          </p:cNvPr>
-          <p:cNvSpPr>
-            <a:spLocks noGrp="1"/>
-          </p:cNvSpPr>
-          <p:nvPr>
-            <p:ph type="ftr" sz="quarter" idx="11"/>
-          </p:nvPr>
-        </p:nvSpPr>
-        <p:spPr/>
-        <p:txBody>
-          <a:bodyPr/>
-          <a:lstStyle/>
-          <a:p>
-            <a:endParaRPr lang="en-US"/>
-          </a:p>
-        </p:txBody>
-      </p:sp>
-      <p:sp>
-        <p:nvSpPr>
-          <p:cNvPr id="6" name="Slide Number Placeholder 5">
-            <a:extLst>
-              <a:ext uri="{FF2B5EF4-FFF2-40B4-BE49-F238E27FC236}">
-                <a16:creationId xmlns:a16="http://schemas.microsoft.com/office/drawing/2014/main" id="{BED05EDE-4C05-9AD4-919C-EF5B2F226ADD}"/>
-              </a:ext>
-            </a:extLst>
-          </p:cNvPr>
-          <p:cNvSpPr>
-            <a:spLocks noGrp="1"/>
-          </p:cNvSpPr>
-          <p:nvPr>
-            <p:ph type="sldNum" sz="quarter" idx="12"/>
-          </p:nvPr>
-        </p:nvSpPr>
-        <p:spPr/>
-        <p:txBody>
-          <a:bodyPr/>
-          <a:lstStyle/>
-          <a:p>
-            <a:fld id="{2E79E3EC-1613-4091-B944-3429E9D119DF}" type="slidenum">
-              <a:rPr lang="en-US" smtClean="0"/>
-              <a:t>‹#›</a:t>
-            </a:fld>
-            <a:endParaRPr lang="en-US" dirty="0"/>
-          </a:p>
-        </p:txBody>
-      </p:sp>
-    </p:spTree>
-    <p:extLst>
-      <p:ext uri="{BB962C8B-B14F-4D97-AF65-F5344CB8AC3E}">
-        <p14:creationId xmlns:p14="http://schemas.microsoft.com/office/powerpoint/2010/main" val="750976725"/>
       </p:ext>
     </p:extLst>
   </p:cSld>
@@ -3896,35 +3953,35 @@
           <a:p>
             <a:pPr lvl="0"/>
             <a:r>
-              <a:rPr lang="en-US"/>
+              <a:rPr lang="en-US" dirty="0"/>
               <a:t>Click to edit Master text styles</a:t>
             </a:r>
           </a:p>
           <a:p>
             <a:pPr lvl="1"/>
             <a:r>
-              <a:rPr lang="en-US"/>
+              <a:rPr lang="en-US" dirty="0"/>
               <a:t>Second level</a:t>
             </a:r>
           </a:p>
           <a:p>
             <a:pPr lvl="2"/>
             <a:r>
-              <a:rPr lang="en-US"/>
+              <a:rPr lang="en-US" dirty="0"/>
               <a:t>Third level</a:t>
             </a:r>
           </a:p>
           <a:p>
             <a:pPr lvl="3"/>
             <a:r>
-              <a:rPr lang="en-US"/>
+              <a:rPr lang="en-US" dirty="0"/>
               <a:t>Fourth level</a:t>
             </a:r>
           </a:p>
           <a:p>
             <a:pPr lvl="4"/>
             <a:r>
-              <a:rPr lang="en-US"/>
+              <a:rPr lang="en-US" dirty="0"/>
               <a:t>Fifth level</a:t>
             </a:r>
           </a:p>
@@ -4118,6 +4175,198 @@
 </file>
 
 <file path=ppt/slideLayouts/slideLayout20.xml><?xml version="1.0" encoding="utf-8"?>
+<p:sldLayout xmlns:a="http://schemas.openxmlformats.org/drawingml/2006/main" xmlns:r="http://schemas.openxmlformats.org/officeDocument/2006/relationships" xmlns:p="http://schemas.openxmlformats.org/presentationml/2006/main" preserve="1" userDrawn="1">
+  <p:cSld name="Title and Vertical Text">
+    <p:spTree>
+      <p:nvGrpSpPr>
+        <p:cNvPr id="1" name=""/>
+        <p:cNvGrpSpPr/>
+        <p:nvPr/>
+      </p:nvGrpSpPr>
+      <p:grpSpPr>
+        <a:xfrm>
+          <a:off x="0" y="0"/>
+          <a:ext cx="0" cy="0"/>
+          <a:chOff x="0" y="0"/>
+          <a:chExt cx="0" cy="0"/>
+        </a:xfrm>
+      </p:grpSpPr>
+      <p:sp>
+        <p:nvSpPr>
+          <p:cNvPr id="3" name="Vertical Text Placeholder 2"/>
+          <p:cNvSpPr>
+            <a:spLocks noGrp="1"/>
+          </p:cNvSpPr>
+          <p:nvPr>
+            <p:ph type="body" orient="vert" idx="1"/>
+          </p:nvPr>
+        </p:nvSpPr>
+        <p:spPr/>
+        <p:txBody>
+          <a:bodyPr vert="eaVert"/>
+          <a:lstStyle/>
+          <a:p>
+            <a:pPr lvl="0"/>
+            <a:r>
+              <a:rPr lang="en-US"/>
+              <a:t>Click to edit Master text styles</a:t>
+            </a:r>
+          </a:p>
+          <a:p>
+            <a:pPr lvl="1"/>
+            <a:r>
+              <a:rPr lang="en-US"/>
+              <a:t>Second level</a:t>
+            </a:r>
+          </a:p>
+          <a:p>
+            <a:pPr lvl="2"/>
+            <a:r>
+              <a:rPr lang="en-US"/>
+              <a:t>Third level</a:t>
+            </a:r>
+          </a:p>
+          <a:p>
+            <a:pPr lvl="3"/>
+            <a:r>
+              <a:rPr lang="en-US"/>
+              <a:t>Fourth level</a:t>
+            </a:r>
+          </a:p>
+          <a:p>
+            <a:pPr lvl="4"/>
+            <a:r>
+              <a:rPr lang="en-US"/>
+              <a:t>Fifth level</a:t>
+            </a:r>
+          </a:p>
+        </p:txBody>
+      </p:sp>
+      <p:sp>
+        <p:nvSpPr>
+          <p:cNvPr id="5" name="Title 4">
+            <a:extLst>
+              <a:ext uri="{FF2B5EF4-FFF2-40B4-BE49-F238E27FC236}">
+                <a16:creationId xmlns:a16="http://schemas.microsoft.com/office/drawing/2014/main" id="{E2BEB535-1D04-3D9D-3D3A-F7419BBAA6EE}"/>
+              </a:ext>
+            </a:extLst>
+          </p:cNvPr>
+          <p:cNvSpPr>
+            <a:spLocks noGrp="1"/>
+          </p:cNvSpPr>
+          <p:nvPr>
+            <p:ph type="title"/>
+          </p:nvPr>
+        </p:nvSpPr>
+        <p:spPr/>
+        <p:txBody>
+          <a:bodyPr/>
+          <a:lstStyle/>
+          <a:p>
+            <a:r>
+              <a:rPr lang="en-US"/>
+              <a:t>Click to edit Master title style</a:t>
+            </a:r>
+          </a:p>
+        </p:txBody>
+      </p:sp>
+      <p:sp>
+        <p:nvSpPr>
+          <p:cNvPr id="2" name="Date Placeholder 1">
+            <a:extLst>
+              <a:ext uri="{FF2B5EF4-FFF2-40B4-BE49-F238E27FC236}">
+                <a16:creationId xmlns:a16="http://schemas.microsoft.com/office/drawing/2014/main" id="{7D1933A3-C226-ECCF-53E6-EE16A5E22F34}"/>
+              </a:ext>
+            </a:extLst>
+          </p:cNvPr>
+          <p:cNvSpPr>
+            <a:spLocks noGrp="1"/>
+          </p:cNvSpPr>
+          <p:nvPr>
+            <p:ph type="dt" sz="half" idx="10"/>
+          </p:nvPr>
+        </p:nvSpPr>
+        <p:spPr/>
+        <p:txBody>
+          <a:bodyPr/>
+          <a:lstStyle/>
+          <a:p>
+            <a:r>
+              <a:rPr lang="en-US"/>
+              <a:t>3/24/2025</a:t>
+            </a:r>
+            <a:endParaRPr lang="en-US" dirty="0"/>
+          </a:p>
+        </p:txBody>
+      </p:sp>
+      <p:sp>
+        <p:nvSpPr>
+          <p:cNvPr id="4" name="Footer Placeholder 3">
+            <a:extLst>
+              <a:ext uri="{FF2B5EF4-FFF2-40B4-BE49-F238E27FC236}">
+                <a16:creationId xmlns:a16="http://schemas.microsoft.com/office/drawing/2014/main" id="{31590124-F4AD-4E6A-3BCC-3A8B143173F0}"/>
+              </a:ext>
+            </a:extLst>
+          </p:cNvPr>
+          <p:cNvSpPr>
+            <a:spLocks noGrp="1"/>
+          </p:cNvSpPr>
+          <p:nvPr>
+            <p:ph type="ftr" sz="quarter" idx="11"/>
+          </p:nvPr>
+        </p:nvSpPr>
+        <p:spPr/>
+        <p:txBody>
+          <a:bodyPr/>
+          <a:lstStyle/>
+          <a:p>
+            <a:endParaRPr lang="en-US"/>
+          </a:p>
+        </p:txBody>
+      </p:sp>
+      <p:sp>
+        <p:nvSpPr>
+          <p:cNvPr id="6" name="Slide Number Placeholder 5">
+            <a:extLst>
+              <a:ext uri="{FF2B5EF4-FFF2-40B4-BE49-F238E27FC236}">
+                <a16:creationId xmlns:a16="http://schemas.microsoft.com/office/drawing/2014/main" id="{BED05EDE-4C05-9AD4-919C-EF5B2F226ADD}"/>
+              </a:ext>
+            </a:extLst>
+          </p:cNvPr>
+          <p:cNvSpPr>
+            <a:spLocks noGrp="1"/>
+          </p:cNvSpPr>
+          <p:nvPr>
+            <p:ph type="sldNum" sz="quarter" idx="12"/>
+          </p:nvPr>
+        </p:nvSpPr>
+        <p:spPr/>
+        <p:txBody>
+          <a:bodyPr/>
+          <a:lstStyle/>
+          <a:p>
+            <a:fld id="{2E79E3EC-1613-4091-B944-3429E9D119DF}" type="slidenum">
+              <a:rPr lang="en-US" smtClean="0"/>
+              <a:t>‹#›</a:t>
+            </a:fld>
+            <a:endParaRPr lang="en-US" dirty="0"/>
+          </a:p>
+        </p:txBody>
+      </p:sp>
+    </p:spTree>
+    <p:extLst>
+      <p:ext uri="{BB962C8B-B14F-4D97-AF65-F5344CB8AC3E}">
+        <p14:creationId xmlns:p14="http://schemas.microsoft.com/office/powerpoint/2010/main" val="750976725"/>
+      </p:ext>
+    </p:extLst>
+  </p:cSld>
+  <p:clrMapOvr>
+    <a:masterClrMapping/>
+  </p:clrMapOvr>
+</p:sldLayout>
+</file>
+
+<file path=ppt/slideLayouts/slideLayout21.xml><?xml version="1.0" encoding="utf-8"?>
 <p:sldLayout xmlns:a="http://schemas.openxmlformats.org/drawingml/2006/main" xmlns:r="http://schemas.openxmlformats.org/officeDocument/2006/relationships" xmlns:p="http://schemas.openxmlformats.org/presentationml/2006/main" type="vertTitleAndTx" preserve="1">
   <p:cSld name="Vertical Title and Text">
     <p:spTree>
@@ -4314,6 +4563,331 @@
 </file>
 
 <file path=ppt/slideLayouts/slideLayout3.xml><?xml version="1.0" encoding="utf-8"?>
+<p:sldLayout xmlns:a="http://schemas.openxmlformats.org/drawingml/2006/main" xmlns:r="http://schemas.openxmlformats.org/officeDocument/2006/relationships" xmlns:p="http://schemas.openxmlformats.org/presentationml/2006/main" type="obj" preserve="1">
+  <p:cSld name="Title and Code">
+    <p:spTree>
+      <p:nvGrpSpPr>
+        <p:cNvPr id="1" name=""/>
+        <p:cNvGrpSpPr/>
+        <p:nvPr/>
+      </p:nvGrpSpPr>
+      <p:grpSpPr>
+        <a:xfrm>
+          <a:off x="0" y="0"/>
+          <a:ext cx="0" cy="0"/>
+          <a:chOff x="0" y="0"/>
+          <a:chExt cx="0" cy="0"/>
+        </a:xfrm>
+      </p:grpSpPr>
+      <p:sp>
+        <p:nvSpPr>
+          <p:cNvPr id="2" name="Title 1">
+            <a:extLst>
+              <a:ext uri="{FF2B5EF4-FFF2-40B4-BE49-F238E27FC236}">
+                <a16:creationId xmlns:a16="http://schemas.microsoft.com/office/drawing/2014/main" id="{98C62312-1078-174F-8DDC-C6C43369E944}"/>
+              </a:ext>
+            </a:extLst>
+          </p:cNvPr>
+          <p:cNvSpPr>
+            <a:spLocks noGrp="1"/>
+          </p:cNvSpPr>
+          <p:nvPr>
+            <p:ph type="title"/>
+          </p:nvPr>
+        </p:nvSpPr>
+        <p:spPr>
+          <a:xfrm>
+            <a:off x="838200" y="483000"/>
+            <a:ext cx="9153939" cy="528354"/>
+          </a:xfrm>
+        </p:spPr>
+        <p:txBody>
+          <a:bodyPr/>
+          <a:lstStyle/>
+          <a:p>
+            <a:r>
+              <a:rPr lang="en-US"/>
+              <a:t>Click to edit Master title style</a:t>
+            </a:r>
+          </a:p>
+        </p:txBody>
+      </p:sp>
+      <p:sp>
+        <p:nvSpPr>
+          <p:cNvPr id="3" name="Content Placeholder 2">
+            <a:extLst>
+              <a:ext uri="{FF2B5EF4-FFF2-40B4-BE49-F238E27FC236}">
+                <a16:creationId xmlns:a16="http://schemas.microsoft.com/office/drawing/2014/main" id="{44262E9A-6027-9B46-A308-F8CDE20E4890}"/>
+              </a:ext>
+            </a:extLst>
+          </p:cNvPr>
+          <p:cNvSpPr>
+            <a:spLocks noGrp="1"/>
+          </p:cNvSpPr>
+          <p:nvPr>
+            <p:ph idx="1"/>
+          </p:nvPr>
+        </p:nvSpPr>
+        <p:spPr>
+          <a:xfrm>
+            <a:off x="838200" y="1683834"/>
+            <a:ext cx="9153939" cy="4493129"/>
+          </a:xfrm>
+          <a:solidFill>
+            <a:schemeClr val="bg1"/>
+          </a:solidFill>
+          <a:ln>
+            <a:solidFill>
+              <a:srgbClr val="BBBBBB"/>
+            </a:solidFill>
+          </a:ln>
+        </p:spPr>
+        <p:txBody>
+          <a:bodyPr>
+            <a:normAutofit/>
+          </a:bodyPr>
+          <a:lstStyle>
+            <a:lvl1pPr marL="0" indent="0">
+              <a:spcBef>
+                <a:spcPts val="1600"/>
+              </a:spcBef>
+              <a:buFontTx/>
+              <a:buNone/>
+              <a:defRPr sz="2000">
+                <a:solidFill>
+                  <a:schemeClr val="tx2"/>
+                </a:solidFill>
+                <a:latin typeface="Consolas" panose="020B0609020204030204" pitchFamily="49" charset="0"/>
+                <a:cs typeface="Courier New" panose="02070309020205020404" pitchFamily="49" charset="0"/>
+              </a:defRPr>
+            </a:lvl1pPr>
+            <a:lvl2pPr marL="203200" indent="0">
+              <a:buNone/>
+              <a:defRPr>
+                <a:solidFill>
+                  <a:schemeClr val="tx1"/>
+                </a:solidFill>
+              </a:defRPr>
+            </a:lvl2pPr>
+            <a:lvl3pPr>
+              <a:defRPr>
+                <a:solidFill>
+                  <a:schemeClr val="tx1"/>
+                </a:solidFill>
+              </a:defRPr>
+            </a:lvl3pPr>
+            <a:lvl4pPr>
+              <a:defRPr>
+                <a:solidFill>
+                  <a:schemeClr val="tx1"/>
+                </a:solidFill>
+              </a:defRPr>
+            </a:lvl4pPr>
+            <a:lvl5pPr>
+              <a:defRPr>
+                <a:solidFill>
+                  <a:schemeClr val="tx1"/>
+                </a:solidFill>
+              </a:defRPr>
+            </a:lvl5pPr>
+          </a:lstStyle>
+          <a:p>
+            <a:pPr lvl="0"/>
+            <a:r>
+              <a:rPr lang="en-US" dirty="0"/>
+              <a:t>Click to edit Master text styles</a:t>
+            </a:r>
+          </a:p>
+        </p:txBody>
+      </p:sp>
+      <p:sp>
+        <p:nvSpPr>
+          <p:cNvPr id="7" name="Rectangle 6">
+            <a:extLst>
+              <a:ext uri="{FF2B5EF4-FFF2-40B4-BE49-F238E27FC236}">
+                <a16:creationId xmlns:a16="http://schemas.microsoft.com/office/drawing/2014/main" id="{FF8DB140-8C70-964C-A6A9-C18661C2892C}"/>
+              </a:ext>
+            </a:extLst>
+          </p:cNvPr>
+          <p:cNvSpPr/>
+          <p:nvPr/>
+        </p:nvSpPr>
+        <p:spPr>
+          <a:xfrm>
+            <a:off x="-1" y="0"/>
+            <a:ext cx="381001" cy="6858000"/>
+          </a:xfrm>
+          <a:prstGeom prst="rect">
+            <a:avLst/>
+          </a:prstGeom>
+          <a:solidFill>
+            <a:schemeClr val="tx1"/>
+          </a:solidFill>
+          <a:ln>
+            <a:noFill/>
+          </a:ln>
+        </p:spPr>
+        <p:style>
+          <a:lnRef idx="2">
+            <a:schemeClr val="accent1">
+              <a:shade val="50000"/>
+            </a:schemeClr>
+          </a:lnRef>
+          <a:fillRef idx="1">
+            <a:schemeClr val="accent1"/>
+          </a:fillRef>
+          <a:effectRef idx="0">
+            <a:schemeClr val="accent1"/>
+          </a:effectRef>
+          <a:fontRef idx="minor">
+            <a:schemeClr val="lt1"/>
+          </a:fontRef>
+        </p:style>
+        <p:txBody>
+          <a:bodyPr rtlCol="0" anchor="ctr"/>
+          <a:lstStyle/>
+          <a:p>
+            <a:pPr algn="ctr"/>
+            <a:endParaRPr lang="en-US"/>
+          </a:p>
+        </p:txBody>
+      </p:sp>
+      <p:cxnSp>
+        <p:nvCxnSpPr>
+          <p:cNvPr id="10" name="Straight Connector 9">
+            <a:extLst>
+              <a:ext uri="{FF2B5EF4-FFF2-40B4-BE49-F238E27FC236}">
+                <a16:creationId xmlns:a16="http://schemas.microsoft.com/office/drawing/2014/main" id="{27DEF3E0-2C1D-FA4B-9E57-877B98F054D2}"/>
+              </a:ext>
+            </a:extLst>
+          </p:cNvPr>
+          <p:cNvCxnSpPr>
+            <a:cxnSpLocks/>
+          </p:cNvCxnSpPr>
+          <p:nvPr/>
+        </p:nvCxnSpPr>
+        <p:spPr>
+          <a:xfrm>
+            <a:off x="838200" y="1305540"/>
+            <a:ext cx="9153939" cy="0"/>
+          </a:xfrm>
+          <a:prstGeom prst="line">
+            <a:avLst/>
+          </a:prstGeom>
+          <a:ln w="12700"/>
+        </p:spPr>
+        <p:style>
+          <a:lnRef idx="1">
+            <a:schemeClr val="accent1"/>
+          </a:lnRef>
+          <a:fillRef idx="0">
+            <a:schemeClr val="accent1"/>
+          </a:fillRef>
+          <a:effectRef idx="0">
+            <a:schemeClr val="accent1"/>
+          </a:effectRef>
+          <a:fontRef idx="minor">
+            <a:schemeClr val="tx1"/>
+          </a:fontRef>
+        </p:style>
+      </p:cxnSp>
+      <p:sp>
+        <p:nvSpPr>
+          <p:cNvPr id="8" name="Date Placeholder 7">
+            <a:extLst>
+              <a:ext uri="{FF2B5EF4-FFF2-40B4-BE49-F238E27FC236}">
+                <a16:creationId xmlns:a16="http://schemas.microsoft.com/office/drawing/2014/main" id="{3F3581ED-A05A-F23D-03FB-9597D4415D6B}"/>
+              </a:ext>
+            </a:extLst>
+          </p:cNvPr>
+          <p:cNvSpPr>
+            <a:spLocks noGrp="1"/>
+          </p:cNvSpPr>
+          <p:nvPr>
+            <p:ph type="dt" sz="half" idx="10"/>
+          </p:nvPr>
+        </p:nvSpPr>
+        <p:spPr/>
+        <p:txBody>
+          <a:bodyPr/>
+          <a:lstStyle/>
+          <a:p>
+            <a:r>
+              <a:rPr lang="en-US"/>
+              <a:t>3/24/2025</a:t>
+            </a:r>
+            <a:endParaRPr lang="en-US" dirty="0"/>
+          </a:p>
+        </p:txBody>
+      </p:sp>
+      <p:sp>
+        <p:nvSpPr>
+          <p:cNvPr id="9" name="Footer Placeholder 8">
+            <a:extLst>
+              <a:ext uri="{FF2B5EF4-FFF2-40B4-BE49-F238E27FC236}">
+                <a16:creationId xmlns:a16="http://schemas.microsoft.com/office/drawing/2014/main" id="{A9D17FCC-C625-437D-537C-1729F3A16C00}"/>
+              </a:ext>
+            </a:extLst>
+          </p:cNvPr>
+          <p:cNvSpPr>
+            <a:spLocks noGrp="1"/>
+          </p:cNvSpPr>
+          <p:nvPr>
+            <p:ph type="ftr" sz="quarter" idx="11"/>
+          </p:nvPr>
+        </p:nvSpPr>
+        <p:spPr/>
+        <p:txBody>
+          <a:bodyPr/>
+          <a:lstStyle/>
+          <a:p>
+            <a:endParaRPr lang="en-US"/>
+          </a:p>
+        </p:txBody>
+      </p:sp>
+      <p:sp>
+        <p:nvSpPr>
+          <p:cNvPr id="11" name="Slide Number Placeholder 10">
+            <a:extLst>
+              <a:ext uri="{FF2B5EF4-FFF2-40B4-BE49-F238E27FC236}">
+                <a16:creationId xmlns:a16="http://schemas.microsoft.com/office/drawing/2014/main" id="{AE16226C-4B6C-837F-7B55-886848EAA656}"/>
+              </a:ext>
+            </a:extLst>
+          </p:cNvPr>
+          <p:cNvSpPr>
+            <a:spLocks noGrp="1"/>
+          </p:cNvSpPr>
+          <p:nvPr>
+            <p:ph type="sldNum" sz="quarter" idx="12"/>
+          </p:nvPr>
+        </p:nvSpPr>
+        <p:spPr/>
+        <p:txBody>
+          <a:bodyPr/>
+          <a:lstStyle/>
+          <a:p>
+            <a:fld id="{2E79E3EC-1613-4091-B944-3429E9D119DF}" type="slidenum">
+              <a:rPr lang="en-US" smtClean="0"/>
+              <a:t>‹#›</a:t>
+            </a:fld>
+            <a:endParaRPr lang="en-US" dirty="0"/>
+          </a:p>
+        </p:txBody>
+      </p:sp>
+    </p:spTree>
+    <p:extLst>
+      <p:ext uri="{BB962C8B-B14F-4D97-AF65-F5344CB8AC3E}">
+        <p14:creationId xmlns:p14="http://schemas.microsoft.com/office/powerpoint/2010/main" val="613311626"/>
+      </p:ext>
+    </p:extLst>
+  </p:cSld>
+  <p:clrMapOvr>
+    <a:masterClrMapping/>
+  </p:clrMapOvr>
+</p:sldLayout>
+</file>
+
+<file path=ppt/slideLayouts/slideLayout4.xml><?xml version="1.0" encoding="utf-8"?>
 <p:sldLayout xmlns:a="http://schemas.openxmlformats.org/drawingml/2006/main" xmlns:r="http://schemas.openxmlformats.org/officeDocument/2006/relationships" xmlns:p="http://schemas.openxmlformats.org/presentationml/2006/main" type="obj" preserve="1">
   <p:cSld name="Dark Title and Content">
     <p:spTree>
@@ -4659,7 +5233,7 @@
 </p:sldLayout>
 </file>
 
-<file path=ppt/slideLayouts/slideLayout4.xml><?xml version="1.0" encoding="utf-8"?>
+<file path=ppt/slideLayouts/slideLayout5.xml><?xml version="1.0" encoding="utf-8"?>
 <p:sldLayout xmlns:a="http://schemas.openxmlformats.org/drawingml/2006/main" xmlns:r="http://schemas.openxmlformats.org/officeDocument/2006/relationships" xmlns:p="http://schemas.openxmlformats.org/presentationml/2006/main" showMasterSp="0" preserve="1">
   <p:cSld name="Section Header">
     <p:bg>
@@ -4865,7 +5439,7 @@
 </p:sldLayout>
 </file>
 
-<file path=ppt/slideLayouts/slideLayout5.xml><?xml version="1.0" encoding="utf-8"?>
+<file path=ppt/slideLayouts/slideLayout6.xml><?xml version="1.0" encoding="utf-8"?>
 <p:sldLayout xmlns:a="http://schemas.openxmlformats.org/drawingml/2006/main" xmlns:r="http://schemas.openxmlformats.org/officeDocument/2006/relationships" xmlns:p="http://schemas.openxmlformats.org/presentationml/2006/main" type="secHead" preserve="1">
   <p:cSld name="Orange Section Header">
     <p:bg>
@@ -5158,7 +5732,7 @@
 </p:sldLayout>
 </file>
 
-<file path=ppt/slideLayouts/slideLayout6.xml><?xml version="1.0" encoding="utf-8"?>
+<file path=ppt/slideLayouts/slideLayout7.xml><?xml version="1.0" encoding="utf-8"?>
 <p:sldLayout xmlns:a="http://schemas.openxmlformats.org/drawingml/2006/main" xmlns:r="http://schemas.openxmlformats.org/officeDocument/2006/relationships" xmlns:p="http://schemas.openxmlformats.org/presentationml/2006/main" type="secHead" preserve="1">
   <p:cSld name="Yellow Section Header">
     <p:bg>
@@ -5451,7 +6025,7 @@
 </p:sldLayout>
 </file>
 
-<file path=ppt/slideLayouts/slideLayout7.xml><?xml version="1.0" encoding="utf-8"?>
+<file path=ppt/slideLayouts/slideLayout8.xml><?xml version="1.0" encoding="utf-8"?>
 <p:sldLayout xmlns:a="http://schemas.openxmlformats.org/drawingml/2006/main" xmlns:r="http://schemas.openxmlformats.org/officeDocument/2006/relationships" xmlns:p="http://schemas.openxmlformats.org/presentationml/2006/main" type="secHead" preserve="1">
   <p:cSld name="Purple Section Header">
     <p:bg>
@@ -5744,7 +6318,7 @@
 </p:sldLayout>
 </file>
 
-<file path=ppt/slideLayouts/slideLayout8.xml><?xml version="1.0" encoding="utf-8"?>
+<file path=ppt/slideLayouts/slideLayout9.xml><?xml version="1.0" encoding="utf-8"?>
 <p:sldLayout xmlns:a="http://schemas.openxmlformats.org/drawingml/2006/main" xmlns:r="http://schemas.openxmlformats.org/officeDocument/2006/relationships" xmlns:p="http://schemas.openxmlformats.org/presentationml/2006/main" preserve="1" userDrawn="1">
   <p:cSld name="Big Idea Slide">
     <p:bg>
@@ -5984,255 +6558,6 @@
     <p:extLst>
       <p:ext uri="{BB962C8B-B14F-4D97-AF65-F5344CB8AC3E}">
         <p14:creationId xmlns:p14="http://schemas.microsoft.com/office/powerpoint/2010/main" val="4180818765"/>
-      </p:ext>
-    </p:extLst>
-  </p:cSld>
-  <p:clrMapOvr>
-    <a:masterClrMapping/>
-  </p:clrMapOvr>
-</p:sldLayout>
-</file>
-
-<file path=ppt/slideLayouts/slideLayout9.xml><?xml version="1.0" encoding="utf-8"?>
-<p:sldLayout xmlns:a="http://schemas.openxmlformats.org/drawingml/2006/main" xmlns:r="http://schemas.openxmlformats.org/officeDocument/2006/relationships" xmlns:p="http://schemas.openxmlformats.org/presentationml/2006/main" preserve="1" userDrawn="1">
-  <p:cSld name="Big Idea Slide-Pharma">
-    <p:bg>
-      <p:bgPr>
-        <a:blipFill dpi="0" rotWithShape="1">
-          <a:blip r:embed="rId2" cstate="screen">
-            <a:lum/>
-            <a:extLst>
-              <a:ext uri="{28A0092B-C50C-407E-A947-70E740481C1C}">
-                <a14:useLocalDpi xmlns:a14="http://schemas.microsoft.com/office/drawing/2010/main"/>
-              </a:ext>
-            </a:extLst>
-          </a:blip>
-          <a:srcRect/>
-          <a:stretch>
-            <a:fillRect/>
-          </a:stretch>
-        </a:blipFill>
-        <a:effectLst/>
-      </p:bgPr>
-    </p:bg>
-    <p:spTree>
-      <p:nvGrpSpPr>
-        <p:cNvPr id="1" name=""/>
-        <p:cNvGrpSpPr/>
-        <p:nvPr/>
-      </p:nvGrpSpPr>
-      <p:grpSpPr>
-        <a:xfrm>
-          <a:off x="0" y="0"/>
-          <a:ext cx="0" cy="0"/>
-          <a:chOff x="0" y="0"/>
-          <a:chExt cx="0" cy="0"/>
-        </a:xfrm>
-      </p:grpSpPr>
-      <p:sp>
-        <p:nvSpPr>
-          <p:cNvPr id="3" name="Title 1">
-            <a:extLst>
-              <a:ext uri="{FF2B5EF4-FFF2-40B4-BE49-F238E27FC236}">
-                <a16:creationId xmlns:a16="http://schemas.microsoft.com/office/drawing/2014/main" id="{3DC1B2E9-91E9-4E4A-9ACC-B3C8E29F4B97}"/>
-              </a:ext>
-            </a:extLst>
-          </p:cNvPr>
-          <p:cNvSpPr>
-            <a:spLocks noGrp="1"/>
-          </p:cNvSpPr>
-          <p:nvPr>
-            <p:ph type="ctrTitle"/>
-          </p:nvPr>
-        </p:nvSpPr>
-        <p:spPr>
-          <a:xfrm>
-            <a:off x="271119" y="459231"/>
-            <a:ext cx="5032401" cy="1661187"/>
-          </a:xfrm>
-        </p:spPr>
-        <p:txBody>
-          <a:bodyPr anchor="b">
-            <a:normAutofit/>
-          </a:bodyPr>
-          <a:lstStyle>
-            <a:lvl1pPr algn="l">
-              <a:defRPr sz="4000" b="1">
-                <a:solidFill>
-                  <a:schemeClr val="bg1"/>
-                </a:solidFill>
-              </a:defRPr>
-            </a:lvl1pPr>
-          </a:lstStyle>
-          <a:p>
-            <a:r>
-              <a:rPr lang="en-US"/>
-              <a:t>Click to edit Master title style</a:t>
-            </a:r>
-          </a:p>
-        </p:txBody>
-      </p:sp>
-      <p:sp>
-        <p:nvSpPr>
-          <p:cNvPr id="4" name="Subtitle 2">
-            <a:extLst>
-              <a:ext uri="{FF2B5EF4-FFF2-40B4-BE49-F238E27FC236}">
-                <a16:creationId xmlns:a16="http://schemas.microsoft.com/office/drawing/2014/main" id="{2AD3EA5D-E588-DE49-84C4-9D7CCE087B79}"/>
-              </a:ext>
-            </a:extLst>
-          </p:cNvPr>
-          <p:cNvSpPr>
-            <a:spLocks noGrp="1"/>
-          </p:cNvSpPr>
-          <p:nvPr>
-            <p:ph type="subTitle" idx="1"/>
-          </p:nvPr>
-        </p:nvSpPr>
-        <p:spPr>
-          <a:xfrm>
-            <a:off x="271118" y="2120420"/>
-            <a:ext cx="5032401" cy="496796"/>
-          </a:xfrm>
-        </p:spPr>
-        <p:txBody>
-          <a:bodyPr/>
-          <a:lstStyle>
-            <a:lvl1pPr marL="0" indent="0" algn="l">
-              <a:buNone/>
-              <a:defRPr sz="2400">
-                <a:solidFill>
-                  <a:schemeClr val="accent1"/>
-                </a:solidFill>
-              </a:defRPr>
-            </a:lvl1pPr>
-            <a:lvl2pPr marL="457200" indent="0" algn="ctr">
-              <a:buNone/>
-              <a:defRPr sz="2000"/>
-            </a:lvl2pPr>
-            <a:lvl3pPr marL="914400" indent="0" algn="ctr">
-              <a:buNone/>
-              <a:defRPr sz="1800"/>
-            </a:lvl3pPr>
-            <a:lvl4pPr marL="1371600" indent="0" algn="ctr">
-              <a:buNone/>
-              <a:defRPr sz="1600"/>
-            </a:lvl4pPr>
-            <a:lvl5pPr marL="1828800" indent="0" algn="ctr">
-              <a:buNone/>
-              <a:defRPr sz="1600"/>
-            </a:lvl5pPr>
-            <a:lvl6pPr marL="2286000" indent="0" algn="ctr">
-              <a:buNone/>
-              <a:defRPr sz="1600"/>
-            </a:lvl6pPr>
-            <a:lvl7pPr marL="2743200" indent="0" algn="ctr">
-              <a:buNone/>
-              <a:defRPr sz="1600"/>
-            </a:lvl7pPr>
-            <a:lvl8pPr marL="3200400" indent="0" algn="ctr">
-              <a:buNone/>
-              <a:defRPr sz="1600"/>
-            </a:lvl8pPr>
-            <a:lvl9pPr marL="3657600" indent="0" algn="ctr">
-              <a:buNone/>
-              <a:defRPr sz="1600"/>
-            </a:lvl9pPr>
-          </a:lstStyle>
-          <a:p>
-            <a:r>
-              <a:rPr lang="en-US"/>
-              <a:t>Click to edit Master subtitle style</a:t>
-            </a:r>
-          </a:p>
-        </p:txBody>
-      </p:sp>
-      <p:sp>
-        <p:nvSpPr>
-          <p:cNvPr id="2" name="Date Placeholder 1">
-            <a:extLst>
-              <a:ext uri="{FF2B5EF4-FFF2-40B4-BE49-F238E27FC236}">
-                <a16:creationId xmlns:a16="http://schemas.microsoft.com/office/drawing/2014/main" id="{DE79A3F2-84EC-3A2C-B4AA-4D0FD7F78CBC}"/>
-              </a:ext>
-            </a:extLst>
-          </p:cNvPr>
-          <p:cNvSpPr>
-            <a:spLocks noGrp="1"/>
-          </p:cNvSpPr>
-          <p:nvPr>
-            <p:ph type="dt" sz="half" idx="10"/>
-          </p:nvPr>
-        </p:nvSpPr>
-        <p:spPr/>
-        <p:txBody>
-          <a:bodyPr/>
-          <a:lstStyle/>
-          <a:p>
-            <a:r>
-              <a:rPr lang="en-US"/>
-              <a:t>3/24/2025</a:t>
-            </a:r>
-            <a:endParaRPr lang="en-US" dirty="0"/>
-          </a:p>
-        </p:txBody>
-      </p:sp>
-      <p:sp>
-        <p:nvSpPr>
-          <p:cNvPr id="5" name="Footer Placeholder 4">
-            <a:extLst>
-              <a:ext uri="{FF2B5EF4-FFF2-40B4-BE49-F238E27FC236}">
-                <a16:creationId xmlns:a16="http://schemas.microsoft.com/office/drawing/2014/main" id="{102C7174-4CC0-42E6-4EF7-9A0201C37039}"/>
-              </a:ext>
-            </a:extLst>
-          </p:cNvPr>
-          <p:cNvSpPr>
-            <a:spLocks noGrp="1"/>
-          </p:cNvSpPr>
-          <p:nvPr>
-            <p:ph type="ftr" sz="quarter" idx="11"/>
-          </p:nvPr>
-        </p:nvSpPr>
-        <p:spPr/>
-        <p:txBody>
-          <a:bodyPr/>
-          <a:lstStyle/>
-          <a:p>
-            <a:endParaRPr lang="en-US"/>
-          </a:p>
-        </p:txBody>
-      </p:sp>
-      <p:sp>
-        <p:nvSpPr>
-          <p:cNvPr id="6" name="Slide Number Placeholder 5">
-            <a:extLst>
-              <a:ext uri="{FF2B5EF4-FFF2-40B4-BE49-F238E27FC236}">
-                <a16:creationId xmlns:a16="http://schemas.microsoft.com/office/drawing/2014/main" id="{D6AECB34-406F-4C02-7A44-484F08A36B53}"/>
-              </a:ext>
-            </a:extLst>
-          </p:cNvPr>
-          <p:cNvSpPr>
-            <a:spLocks noGrp="1"/>
-          </p:cNvSpPr>
-          <p:nvPr>
-            <p:ph type="sldNum" sz="quarter" idx="12"/>
-          </p:nvPr>
-        </p:nvSpPr>
-        <p:spPr/>
-        <p:txBody>
-          <a:bodyPr/>
-          <a:lstStyle/>
-          <a:p>
-            <a:fld id="{2E79E3EC-1613-4091-B944-3429E9D119DF}" type="slidenum">
-              <a:rPr lang="en-US" smtClean="0"/>
-              <a:t>‹#›</a:t>
-            </a:fld>
-            <a:endParaRPr lang="en-US" dirty="0"/>
-          </a:p>
-        </p:txBody>
-      </p:sp>
-    </p:spTree>
-    <p:extLst>
-      <p:ext uri="{BB962C8B-B14F-4D97-AF65-F5344CB8AC3E}">
-        <p14:creationId xmlns:p14="http://schemas.microsoft.com/office/powerpoint/2010/main" val="1644859707"/>
       </p:ext>
     </p:extLst>
   </p:cSld>
@@ -6384,10 +6709,10 @@
           <p:nvPr/>
         </p:nvPicPr>
         <p:blipFill>
-          <a:blip r:embed="rId22">
+          <a:blip r:embed="rId23">
             <a:extLst>
               <a:ext uri="{96DAC541-7B7A-43D3-8B79-37D633B846F1}">
-                <asvg:svgBlip xmlns:asvg="http://schemas.microsoft.com/office/drawing/2016/SVG/main" r:embed="rId23"/>
+                <asvg:svgBlip xmlns:asvg="http://schemas.microsoft.com/office/drawing/2016/SVG/main" r:embed="rId24"/>
               </a:ext>
             </a:extLst>
           </a:blip>
@@ -6553,24 +6878,25 @@
   <p:sldLayoutIdLst>
     <p:sldLayoutId id="2147483661" r:id="rId1"/>
     <p:sldLayoutId id="2147483664" r:id="rId2"/>
-    <p:sldLayoutId id="2147483681" r:id="rId3"/>
-    <p:sldLayoutId id="2147483674" r:id="rId4"/>
-    <p:sldLayoutId id="2147483678" r:id="rId5"/>
-    <p:sldLayoutId id="2147483679" r:id="rId6"/>
-    <p:sldLayoutId id="2147483680" r:id="rId7"/>
-    <p:sldLayoutId id="2147483682" r:id="rId8"/>
-    <p:sldLayoutId id="2147483683" r:id="rId9"/>
-    <p:sldLayoutId id="2147483684" r:id="rId10"/>
-    <p:sldLayoutId id="2147483685" r:id="rId11"/>
-    <p:sldLayoutId id="2147483686" r:id="rId12"/>
-    <p:sldLayoutId id="2147483666" r:id="rId13"/>
-    <p:sldLayoutId id="2147483667" r:id="rId14"/>
-    <p:sldLayoutId id="2147483668" r:id="rId15"/>
-    <p:sldLayoutId id="2147483670" r:id="rId16"/>
-    <p:sldLayoutId id="2147483675" r:id="rId17"/>
-    <p:sldLayoutId id="2147483669" r:id="rId18"/>
-    <p:sldLayoutId id="2147483676" r:id="rId19"/>
-    <p:sldLayoutId id="2147483677" r:id="rId20"/>
+    <p:sldLayoutId id="2147483687" r:id="rId3"/>
+    <p:sldLayoutId id="2147483681" r:id="rId4"/>
+    <p:sldLayoutId id="2147483674" r:id="rId5"/>
+    <p:sldLayoutId id="2147483678" r:id="rId6"/>
+    <p:sldLayoutId id="2147483679" r:id="rId7"/>
+    <p:sldLayoutId id="2147483680" r:id="rId8"/>
+    <p:sldLayoutId id="2147483682" r:id="rId9"/>
+    <p:sldLayoutId id="2147483683" r:id="rId10"/>
+    <p:sldLayoutId id="2147483684" r:id="rId11"/>
+    <p:sldLayoutId id="2147483685" r:id="rId12"/>
+    <p:sldLayoutId id="2147483686" r:id="rId13"/>
+    <p:sldLayoutId id="2147483666" r:id="rId14"/>
+    <p:sldLayoutId id="2147483667" r:id="rId15"/>
+    <p:sldLayoutId id="2147483668" r:id="rId16"/>
+    <p:sldLayoutId id="2147483670" r:id="rId17"/>
+    <p:sldLayoutId id="2147483675" r:id="rId18"/>
+    <p:sldLayoutId id="2147483669" r:id="rId19"/>
+    <p:sldLayoutId id="2147483676" r:id="rId20"/>
+    <p:sldLayoutId id="2147483677" r:id="rId21"/>
   </p:sldLayoutIdLst>
   <p:hf sldNum="0" hdr="0" ftr="0" dt="0"/>
   <p:txStyles>

</xml_diff>